<commit_message>
New picture of speaker model
</commit_message>
<xml_diff>
--- a/Presentation/Speaker Modelling.pptx
+++ b/Presentation/Speaker Modelling.pptx
@@ -113,6 +113,11 @@
       </a:defRPr>
     </a:lvl9pPr>
   </p:defaultTextStyle>
+  <p:extLst>
+    <p:ext uri="{EFAFB233-063F-42B5-8137-9DF3F51BA10A}">
+      <p15:sldGuideLst xmlns:p15="http://schemas.microsoft.com/office/powerpoint/2012/main"/>
+    </p:ext>
+  </p:extLst>
 </p:presentation>
 </file>
 
@@ -4473,7 +4478,7 @@
                 </a:solidFill>
                 <a:latin typeface="Calibri"/>
               </a:rPr>
-              <a:t>6/14/2018</a:t>
+              <a:t>6/15/2018</a:t>
             </a:fld>
             <a:endParaRPr lang="en" sz="900" b="0" strike="noStrike" spc="-1">
               <a:latin typeface="Times New Roman"/>
@@ -5444,7 +5449,7 @@
                 </a:solidFill>
                 <a:latin typeface="Calibri"/>
               </a:rPr>
-              <a:t>6/14/2018</a:t>
+              <a:t>6/15/2018</a:t>
             </a:fld>
             <a:endParaRPr lang="en" sz="900" b="0" strike="noStrike" spc="-1">
               <a:latin typeface="Times New Roman"/>
@@ -6721,10 +6726,10 @@
       </p:pic>
       <p:pic>
         <p:nvPicPr>
-          <p:cNvPr id="2" name="Picture 1">
+          <p:cNvPr id="4" name="Picture 3">
             <a:extLst>
               <a:ext uri="{FF2B5EF4-FFF2-40B4-BE49-F238E27FC236}">
-                <a16:creationId xmlns:a16="http://schemas.microsoft.com/office/drawing/2014/main" id="{5ED7E296-5A65-47D3-A635-27B37A220F1F}"/>
+                <a16:creationId xmlns:a16="http://schemas.microsoft.com/office/drawing/2014/main" id="{E2D71FE5-5A90-43C9-93FE-9FE857F27BFB}"/>
               </a:ext>
             </a:extLst>
           </p:cNvPr>
@@ -6734,15 +6739,21 @@
           <p:nvPr/>
         </p:nvPicPr>
         <p:blipFill>
-          <a:blip r:embed="rId5"/>
+          <a:blip r:embed="rId5">
+            <a:extLst>
+              <a:ext uri="{28A0092B-C50C-407E-A947-70E740481C1C}">
+                <a14:useLocalDpi xmlns:a14="http://schemas.microsoft.com/office/drawing/2010/main" val="0"/>
+              </a:ext>
+            </a:extLst>
+          </a:blip>
           <a:stretch>
             <a:fillRect/>
           </a:stretch>
         </p:blipFill>
         <p:spPr>
           <a:xfrm>
-            <a:off x="5688334" y="1938796"/>
-            <a:ext cx="5466986" cy="1834437"/>
+            <a:off x="5047325" y="1988383"/>
+            <a:ext cx="6107995" cy="1358075"/>
           </a:xfrm>
           <a:prstGeom prst="rect">
             <a:avLst/>

</xml_diff>